<commit_message>
label axis error corrected
</commit_message>
<xml_diff>
--- a/investigating_flight_delays_newark.pptx
+++ b/investigating_flight_delays_newark.pptx
@@ -139,7 +139,7 @@
 <file path=ppt/revisionInfo.xml><?xml version="1.0" encoding="utf-8"?>
 <p1510:revInfo xmlns:a="http://schemas.openxmlformats.org/drawingml/2006/main" xmlns:r="http://schemas.openxmlformats.org/officeDocument/2006/relationships" xmlns:p1510="http://schemas.microsoft.com/office/powerpoint/2015/10/main">
   <p1510:revLst>
-    <p1510:client id="{3089DFEA-8D83-4ED0-89C8-568DF49BA8E7}" v="167" dt="2023-05-02T10:38:47.796"/>
+    <p1510:client id="{3089DFEA-8D83-4ED0-89C8-568DF49BA8E7}" v="168" dt="2023-05-03T11:19:18.040"/>
   </p1510:revLst>
 </p1510:revInfo>
 </file>
@@ -149,7 +149,7 @@
   <pc:docChgLst>
     <pc:chgData name="Karen Gibson" userId="c392f04a823fc96c" providerId="LiveId" clId="{3089DFEA-8D83-4ED0-89C8-568DF49BA8E7}"/>
     <pc:docChg chg="undo custSel addSld delSld modSld sldOrd modMainMaster modNotesMaster">
-      <pc:chgData name="Karen Gibson" userId="c392f04a823fc96c" providerId="LiveId" clId="{3089DFEA-8D83-4ED0-89C8-568DF49BA8E7}" dt="2023-05-02T15:00:23.089" v="14189" actId="20577"/>
+      <pc:chgData name="Karen Gibson" userId="c392f04a823fc96c" providerId="LiveId" clId="{3089DFEA-8D83-4ED0-89C8-568DF49BA8E7}" dt="2023-05-03T11:19:27.817" v="14195" actId="14100"/>
       <pc:docMkLst>
         <pc:docMk/>
       </pc:docMkLst>
@@ -634,7 +634,7 @@
         </pc:picChg>
       </pc:sldChg>
       <pc:sldChg chg="addSp delSp modSp add mod modNotesTx">
-        <pc:chgData name="Karen Gibson" userId="c392f04a823fc96c" providerId="LiveId" clId="{3089DFEA-8D83-4ED0-89C8-568DF49BA8E7}" dt="2023-05-02T10:24:21.490" v="11980" actId="20577"/>
+        <pc:chgData name="Karen Gibson" userId="c392f04a823fc96c" providerId="LiveId" clId="{3089DFEA-8D83-4ED0-89C8-568DF49BA8E7}" dt="2023-05-03T11:19:27.817" v="14195" actId="14100"/>
         <pc:sldMkLst>
           <pc:docMk/>
           <pc:sldMk cId="628037149" sldId="265"/>
@@ -655,6 +655,14 @@
             <ac:spMk id="9" creationId="{A6D2FCF8-5541-7E73-C809-0642CB3AE1BE}"/>
           </ac:spMkLst>
         </pc:spChg>
+        <pc:picChg chg="add mod">
+          <ac:chgData name="Karen Gibson" userId="c392f04a823fc96c" providerId="LiveId" clId="{3089DFEA-8D83-4ED0-89C8-568DF49BA8E7}" dt="2023-05-03T11:19:27.817" v="14195" actId="14100"/>
+          <ac:picMkLst>
+            <pc:docMk/>
+            <pc:sldMk cId="628037149" sldId="265"/>
+            <ac:picMk id="3" creationId="{7E9E7706-9D89-9D73-1609-73CFB5ED7070}"/>
+          </ac:picMkLst>
+        </pc:picChg>
         <pc:picChg chg="add del mod">
           <ac:chgData name="Karen Gibson" userId="c392f04a823fc96c" providerId="LiveId" clId="{3089DFEA-8D83-4ED0-89C8-568DF49BA8E7}" dt="2023-05-01T08:11:25.011" v="3297" actId="478"/>
           <ac:picMkLst>
@@ -671,8 +679,8 @@
             <ac:picMk id="6" creationId="{E04EEF66-0303-A549-D5C5-2968955FAFEF}"/>
           </ac:picMkLst>
         </pc:picChg>
-        <pc:picChg chg="add mod">
-          <ac:chgData name="Karen Gibson" userId="c392f04a823fc96c" providerId="LiveId" clId="{3089DFEA-8D83-4ED0-89C8-568DF49BA8E7}" dt="2023-05-01T08:35:43.012" v="3348" actId="14100"/>
+        <pc:picChg chg="add del mod">
+          <ac:chgData name="Karen Gibson" userId="c392f04a823fc96c" providerId="LiveId" clId="{3089DFEA-8D83-4ED0-89C8-568DF49BA8E7}" dt="2023-05-03T11:19:02.348" v="14190" actId="478"/>
           <ac:picMkLst>
             <pc:docMk/>
             <pc:sldMk cId="628037149" sldId="265"/>
@@ -11887,42 +11895,6 @@
           </a:p>
         </p:txBody>
       </p:sp>
-      <p:pic>
-        <p:nvPicPr>
-          <p:cNvPr id="8" name="Picture 7" descr="Chart&#10;&#10;Description automatically generated">
-            <a:extLst>
-              <a:ext uri="{FF2B5EF4-FFF2-40B4-BE49-F238E27FC236}">
-                <a16:creationId xmlns:a16="http://schemas.microsoft.com/office/drawing/2014/main" id="{74D5F771-E17A-7DB2-C27C-020C9F62FBC2}"/>
-              </a:ext>
-            </a:extLst>
-          </p:cNvPr>
-          <p:cNvPicPr>
-            <a:picLocks noChangeAspect="1"/>
-          </p:cNvPicPr>
-          <p:nvPr/>
-        </p:nvPicPr>
-        <p:blipFill>
-          <a:blip r:embed="rId3">
-            <a:extLst>
-              <a:ext uri="{28A0092B-C50C-407E-A947-70E740481C1C}">
-                <a14:useLocalDpi xmlns:a14="http://schemas.microsoft.com/office/drawing/2010/main" val="0"/>
-              </a:ext>
-            </a:extLst>
-          </a:blip>
-          <a:stretch>
-            <a:fillRect/>
-          </a:stretch>
-        </p:blipFill>
-        <p:spPr>
-          <a:xfrm>
-            <a:off x="191344" y="1412776"/>
-            <a:ext cx="7920880" cy="4968552"/>
-          </a:xfrm>
-          <a:prstGeom prst="rect">
-            <a:avLst/>
-          </a:prstGeom>
-        </p:spPr>
-      </p:pic>
       <p:sp>
         <p:nvSpPr>
           <p:cNvPr id="9" name="TextBox 8">
@@ -11988,6 +11960,42 @@
           </a:p>
         </p:txBody>
       </p:sp>
+      <p:pic>
+        <p:nvPicPr>
+          <p:cNvPr id="3" name="Picture 2" descr="A picture containing text, diagram, line, plot&#10;&#10;Description automatically generated">
+            <a:extLst>
+              <a:ext uri="{FF2B5EF4-FFF2-40B4-BE49-F238E27FC236}">
+                <a16:creationId xmlns:a16="http://schemas.microsoft.com/office/drawing/2014/main" id="{7E9E7706-9D89-9D73-1609-73CFB5ED7070}"/>
+              </a:ext>
+            </a:extLst>
+          </p:cNvPr>
+          <p:cNvPicPr>
+            <a:picLocks noChangeAspect="1"/>
+          </p:cNvPicPr>
+          <p:nvPr/>
+        </p:nvPicPr>
+        <p:blipFill>
+          <a:blip r:embed="rId3">
+            <a:extLst>
+              <a:ext uri="{28A0092B-C50C-407E-A947-70E740481C1C}">
+                <a14:useLocalDpi xmlns:a14="http://schemas.microsoft.com/office/drawing/2010/main" val="0"/>
+              </a:ext>
+            </a:extLst>
+          </a:blip>
+          <a:stretch>
+            <a:fillRect/>
+          </a:stretch>
+        </p:blipFill>
+        <p:spPr>
+          <a:xfrm>
+            <a:off x="119336" y="1412776"/>
+            <a:ext cx="8064896" cy="4338901"/>
+          </a:xfrm>
+          <a:prstGeom prst="rect">
+            <a:avLst/>
+          </a:prstGeom>
+        </p:spPr>
+      </p:pic>
     </p:spTree>
     <p:extLst>
       <p:ext uri="{BB962C8B-B14F-4D97-AF65-F5344CB8AC3E}">

</xml_diff>